<commit_message>
added logos for frameworks
</commit_message>
<xml_diff>
--- a/Abschlusspräsentation/Abschlusspräsentation.pptx
+++ b/Abschlusspräsentation/Abschlusspräsentation.pptx
@@ -3259,10 +3259,9 @@
           <a:lstStyle/>
           <a:p>
             <a:r>
-              <a:rPr lang="de-DE" dirty="0" err="1"/>
-              <a:t>Systemarchitekur</a:t>
-            </a:r>
-            <a:endParaRPr lang="de-DE" dirty="0"/>
+              <a:rPr lang="de-DE" dirty="0"/>
+              <a:t>Systemarchitektur</a:t>
+            </a:r>
           </a:p>
           <a:p>
             <a:r>
@@ -3281,6 +3280,156 @@
           </a:p>
         </p:txBody>
       </p:sp>
+      <p:pic>
+        <p:nvPicPr>
+          <p:cNvPr id="5" name="Grafik 4"/>
+          <p:cNvPicPr>
+            <a:picLocks noChangeAspect="1"/>
+          </p:cNvPicPr>
+          <p:nvPr/>
+        </p:nvPicPr>
+        <p:blipFill>
+          <a:blip r:embed="rId2">
+            <a:extLst>
+              <a:ext uri="{28A0092B-C50C-407E-A947-70E740481C1C}">
+                <a14:useLocalDpi xmlns:a14="http://schemas.microsoft.com/office/drawing/2010/main" val="0"/>
+              </a:ext>
+            </a:extLst>
+          </a:blip>
+          <a:stretch>
+            <a:fillRect/>
+          </a:stretch>
+        </p:blipFill>
+        <p:spPr>
+          <a:xfrm>
+            <a:off x="8687867" y="5270183"/>
+            <a:ext cx="2665933" cy="906780"/>
+          </a:xfrm>
+          <a:prstGeom prst="rect">
+            <a:avLst/>
+          </a:prstGeom>
+        </p:spPr>
+      </p:pic>
+      <p:pic>
+        <p:nvPicPr>
+          <p:cNvPr id="7" name="Grafik 6"/>
+          <p:cNvPicPr>
+            <a:picLocks noChangeAspect="1"/>
+          </p:cNvPicPr>
+          <p:nvPr/>
+        </p:nvPicPr>
+        <p:blipFill>
+          <a:blip r:embed="rId3">
+            <a:extLst>
+              <a:ext uri="{28A0092B-C50C-407E-A947-70E740481C1C}">
+                <a14:useLocalDpi xmlns:a14="http://schemas.microsoft.com/office/drawing/2010/main" val="0"/>
+              </a:ext>
+            </a:extLst>
+          </a:blip>
+          <a:stretch>
+            <a:fillRect/>
+          </a:stretch>
+        </p:blipFill>
+        <p:spPr>
+          <a:xfrm>
+            <a:off x="6320932" y="5199172"/>
+            <a:ext cx="2047916" cy="981064"/>
+          </a:xfrm>
+          <a:prstGeom prst="rect">
+            <a:avLst/>
+          </a:prstGeom>
+        </p:spPr>
+      </p:pic>
+      <p:pic>
+        <p:nvPicPr>
+          <p:cNvPr id="9" name="Grafik 8"/>
+          <p:cNvPicPr>
+            <a:picLocks noChangeAspect="1"/>
+          </p:cNvPicPr>
+          <p:nvPr/>
+        </p:nvPicPr>
+        <p:blipFill>
+          <a:blip r:embed="rId4">
+            <a:extLst>
+              <a:ext uri="{28A0092B-C50C-407E-A947-70E740481C1C}">
+                <a14:useLocalDpi xmlns:a14="http://schemas.microsoft.com/office/drawing/2010/main" val="0"/>
+              </a:ext>
+            </a:extLst>
+          </a:blip>
+          <a:stretch>
+            <a:fillRect/>
+          </a:stretch>
+        </p:blipFill>
+        <p:spPr>
+          <a:xfrm>
+            <a:off x="7370282" y="3617228"/>
+            <a:ext cx="3028950" cy="1514475"/>
+          </a:xfrm>
+          <a:prstGeom prst="rect">
+            <a:avLst/>
+          </a:prstGeom>
+        </p:spPr>
+      </p:pic>
+      <p:pic>
+        <p:nvPicPr>
+          <p:cNvPr id="11" name="Grafik 10"/>
+          <p:cNvPicPr>
+            <a:picLocks noChangeAspect="1"/>
+          </p:cNvPicPr>
+          <p:nvPr/>
+        </p:nvPicPr>
+        <p:blipFill>
+          <a:blip r:embed="rId5">
+            <a:extLst>
+              <a:ext uri="{28A0092B-C50C-407E-A947-70E740481C1C}">
+                <a14:useLocalDpi xmlns:a14="http://schemas.microsoft.com/office/drawing/2010/main" val="0"/>
+              </a:ext>
+            </a:extLst>
+          </a:blip>
+          <a:stretch>
+            <a:fillRect/>
+          </a:stretch>
+        </p:blipFill>
+        <p:spPr>
+          <a:xfrm>
+            <a:off x="3875423" y="4961573"/>
+            <a:ext cx="1524000" cy="1524000"/>
+          </a:xfrm>
+          <a:prstGeom prst="rect">
+            <a:avLst/>
+          </a:prstGeom>
+        </p:spPr>
+      </p:pic>
+      <p:pic>
+        <p:nvPicPr>
+          <p:cNvPr id="13" name="Grafik 12"/>
+          <p:cNvPicPr>
+            <a:picLocks noChangeAspect="1"/>
+          </p:cNvPicPr>
+          <p:nvPr/>
+        </p:nvPicPr>
+        <p:blipFill>
+          <a:blip r:embed="rId6">
+            <a:extLst>
+              <a:ext uri="{28A0092B-C50C-407E-A947-70E740481C1C}">
+                <a14:useLocalDpi xmlns:a14="http://schemas.microsoft.com/office/drawing/2010/main" val="0"/>
+              </a:ext>
+            </a:extLst>
+          </a:blip>
+          <a:stretch>
+            <a:fillRect/>
+          </a:stretch>
+        </p:blipFill>
+        <p:spPr>
+          <a:xfrm>
+            <a:off x="4323534" y="4204221"/>
+            <a:ext cx="2480478" cy="689883"/>
+          </a:xfrm>
+          <a:prstGeom prst="rect">
+            <a:avLst/>
+          </a:prstGeom>
+        </p:spPr>
+      </p:pic>
     </p:spTree>
     <p:extLst>
       <p:ext uri="{BB962C8B-B14F-4D97-AF65-F5344CB8AC3E}">
@@ -3865,7 +4014,7 @@
         <p:spPr/>
         <p:txBody>
           <a:bodyPr>
-            <a:normAutofit lnSpcReduction="10000"/>
+            <a:normAutofit/>
           </a:bodyPr>
           <a:lstStyle/>
           <a:p>
@@ -3928,13 +4077,6 @@
             <a:r>
               <a:rPr lang="de-DE" dirty="0"/>
               <a:t>Probleme rechtzeitig kommunizieren</a:t>
-            </a:r>
-          </a:p>
-          <a:p>
-            <a:pPr lvl="1"/>
-            <a:r>
-              <a:rPr lang="de-DE" dirty="0"/>
-              <a:t>Arbeiten in einer Gruppe</a:t>
             </a:r>
           </a:p>
           <a:p>

</xml_diff>

<commit_message>
added missing framework logos
</commit_message>
<xml_diff>
--- a/Abschlusspräsentation/Abschlusspräsentation.pptx
+++ b/Abschlusspräsentation/Abschlusspräsentation.pptx
@@ -270,7 +270,7 @@
           <a:p>
             <a:fld id="{CD69044A-C769-4552-8429-3F47D64660A8}" type="datetimeFigureOut">
               <a:rPr lang="de-DE" smtClean="0"/>
-              <a:t>17.03.2017</a:t>
+              <a:t>19.03.2017</a:t>
             </a:fld>
             <a:endParaRPr lang="de-DE"/>
           </a:p>
@@ -440,7 +440,7 @@
           <a:p>
             <a:fld id="{CD69044A-C769-4552-8429-3F47D64660A8}" type="datetimeFigureOut">
               <a:rPr lang="de-DE" smtClean="0"/>
-              <a:t>17.03.2017</a:t>
+              <a:t>19.03.2017</a:t>
             </a:fld>
             <a:endParaRPr lang="de-DE"/>
           </a:p>
@@ -620,7 +620,7 @@
           <a:p>
             <a:fld id="{CD69044A-C769-4552-8429-3F47D64660A8}" type="datetimeFigureOut">
               <a:rPr lang="de-DE" smtClean="0"/>
-              <a:t>17.03.2017</a:t>
+              <a:t>19.03.2017</a:t>
             </a:fld>
             <a:endParaRPr lang="de-DE"/>
           </a:p>
@@ -823,7 +823,7 @@
           <a:p>
             <a:fld id="{CD69044A-C769-4552-8429-3F47D64660A8}" type="datetimeFigureOut">
               <a:rPr lang="de-DE" smtClean="0"/>
-              <a:t>17.03.2017</a:t>
+              <a:t>19.03.2017</a:t>
             </a:fld>
             <a:endParaRPr lang="de-DE"/>
           </a:p>
@@ -993,7 +993,7 @@
           <a:p>
             <a:fld id="{CD69044A-C769-4552-8429-3F47D64660A8}" type="datetimeFigureOut">
               <a:rPr lang="de-DE" smtClean="0"/>
-              <a:t>17.03.2017</a:t>
+              <a:t>19.03.2017</a:t>
             </a:fld>
             <a:endParaRPr lang="de-DE"/>
           </a:p>
@@ -1244,7 +1244,7 @@
           <a:p>
             <a:fld id="{CD69044A-C769-4552-8429-3F47D64660A8}" type="datetimeFigureOut">
               <a:rPr lang="de-DE" smtClean="0"/>
-              <a:t>17.03.2017</a:t>
+              <a:t>19.03.2017</a:t>
             </a:fld>
             <a:endParaRPr lang="de-DE"/>
           </a:p>
@@ -1476,7 +1476,7 @@
           <a:p>
             <a:fld id="{CD69044A-C769-4552-8429-3F47D64660A8}" type="datetimeFigureOut">
               <a:rPr lang="de-DE" smtClean="0"/>
-              <a:t>17.03.2017</a:t>
+              <a:t>19.03.2017</a:t>
             </a:fld>
             <a:endParaRPr lang="de-DE"/>
           </a:p>
@@ -1823,7 +1823,7 @@
           <a:p>
             <a:fld id="{CD69044A-C769-4552-8429-3F47D64660A8}" type="datetimeFigureOut">
               <a:rPr lang="de-DE" smtClean="0"/>
-              <a:t>17.03.2017</a:t>
+              <a:t>19.03.2017</a:t>
             </a:fld>
             <a:endParaRPr lang="de-DE"/>
           </a:p>
@@ -1941,7 +1941,7 @@
           <a:p>
             <a:fld id="{CD69044A-C769-4552-8429-3F47D64660A8}" type="datetimeFigureOut">
               <a:rPr lang="de-DE" smtClean="0"/>
-              <a:t>17.03.2017</a:t>
+              <a:t>19.03.2017</a:t>
             </a:fld>
             <a:endParaRPr lang="de-DE"/>
           </a:p>
@@ -2059,7 +2059,7 @@
           <a:p>
             <a:fld id="{CD69044A-C769-4552-8429-3F47D64660A8}" type="datetimeFigureOut">
               <a:rPr lang="de-DE" smtClean="0"/>
-              <a:t>17.03.2017</a:t>
+              <a:t>19.03.2017</a:t>
             </a:fld>
             <a:endParaRPr lang="de-DE"/>
           </a:p>
@@ -2343,7 +2343,7 @@
           <a:p>
             <a:fld id="{CD69044A-C769-4552-8429-3F47D64660A8}" type="datetimeFigureOut">
               <a:rPr lang="de-DE" smtClean="0"/>
-              <a:t>17.03.2017</a:t>
+              <a:t>19.03.2017</a:t>
             </a:fld>
             <a:endParaRPr lang="de-DE"/>
           </a:p>
@@ -2513,7 +2513,7 @@
           <a:p>
             <a:fld id="{CD69044A-C769-4552-8429-3F47D64660A8}" type="datetimeFigureOut">
               <a:rPr lang="de-DE" smtClean="0"/>
-              <a:t>17.03.2017</a:t>
+              <a:t>19.03.2017</a:t>
             </a:fld>
             <a:endParaRPr lang="de-DE"/>
           </a:p>
@@ -2777,7 +2777,7 @@
           <a:p>
             <a:fld id="{CD69044A-C769-4552-8429-3F47D64660A8}" type="datetimeFigureOut">
               <a:rPr lang="de-DE" smtClean="0"/>
-              <a:t>17.03.2017</a:t>
+              <a:t>19.03.2017</a:t>
             </a:fld>
             <a:endParaRPr lang="de-DE"/>
           </a:p>
@@ -2947,7 +2947,7 @@
           <a:p>
             <a:fld id="{CD69044A-C769-4552-8429-3F47D64660A8}" type="datetimeFigureOut">
               <a:rPr lang="de-DE" smtClean="0"/>
-              <a:t>17.03.2017</a:t>
+              <a:t>19.03.2017</a:t>
             </a:fld>
             <a:endParaRPr lang="de-DE"/>
           </a:p>
@@ -3127,7 +3127,7 @@
           <a:p>
             <a:fld id="{CD69044A-C769-4552-8429-3F47D64660A8}" type="datetimeFigureOut">
               <a:rPr lang="de-DE" smtClean="0"/>
-              <a:t>17.03.2017</a:t>
+              <a:t>19.03.2017</a:t>
             </a:fld>
             <a:endParaRPr lang="de-DE"/>
           </a:p>
@@ -3330,7 +3330,7 @@
           <a:p>
             <a:fld id="{CD69044A-C769-4552-8429-3F47D64660A8}" type="datetimeFigureOut">
               <a:rPr lang="de-DE" smtClean="0"/>
-              <a:t>17.03.2017</a:t>
+              <a:t>19.03.2017</a:t>
             </a:fld>
             <a:endParaRPr lang="de-DE"/>
           </a:p>
@@ -3500,7 +3500,7 @@
           <a:p>
             <a:fld id="{CD69044A-C769-4552-8429-3F47D64660A8}" type="datetimeFigureOut">
               <a:rPr lang="de-DE" smtClean="0"/>
-              <a:t>17.03.2017</a:t>
+              <a:t>19.03.2017</a:t>
             </a:fld>
             <a:endParaRPr lang="de-DE"/>
           </a:p>
@@ -3751,7 +3751,7 @@
           <a:p>
             <a:fld id="{CD69044A-C769-4552-8429-3F47D64660A8}" type="datetimeFigureOut">
               <a:rPr lang="de-DE" smtClean="0"/>
-              <a:t>17.03.2017</a:t>
+              <a:t>19.03.2017</a:t>
             </a:fld>
             <a:endParaRPr lang="de-DE"/>
           </a:p>
@@ -3983,7 +3983,7 @@
           <a:p>
             <a:fld id="{CD69044A-C769-4552-8429-3F47D64660A8}" type="datetimeFigureOut">
               <a:rPr lang="de-DE" smtClean="0"/>
-              <a:t>17.03.2017</a:t>
+              <a:t>19.03.2017</a:t>
             </a:fld>
             <a:endParaRPr lang="de-DE"/>
           </a:p>
@@ -4330,7 +4330,7 @@
           <a:p>
             <a:fld id="{CD69044A-C769-4552-8429-3F47D64660A8}" type="datetimeFigureOut">
               <a:rPr lang="de-DE" smtClean="0"/>
-              <a:t>17.03.2017</a:t>
+              <a:t>19.03.2017</a:t>
             </a:fld>
             <a:endParaRPr lang="de-DE"/>
           </a:p>
@@ -4448,7 +4448,7 @@
           <a:p>
             <a:fld id="{CD69044A-C769-4552-8429-3F47D64660A8}" type="datetimeFigureOut">
               <a:rPr lang="de-DE" smtClean="0"/>
-              <a:t>17.03.2017</a:t>
+              <a:t>19.03.2017</a:t>
             </a:fld>
             <a:endParaRPr lang="de-DE"/>
           </a:p>
@@ -4566,7 +4566,7 @@
           <a:p>
             <a:fld id="{CD69044A-C769-4552-8429-3F47D64660A8}" type="datetimeFigureOut">
               <a:rPr lang="de-DE" smtClean="0"/>
-              <a:t>17.03.2017</a:t>
+              <a:t>19.03.2017</a:t>
             </a:fld>
             <a:endParaRPr lang="de-DE"/>
           </a:p>
@@ -4817,7 +4817,7 @@
           <a:p>
             <a:fld id="{CD69044A-C769-4552-8429-3F47D64660A8}" type="datetimeFigureOut">
               <a:rPr lang="de-DE" smtClean="0"/>
-              <a:t>17.03.2017</a:t>
+              <a:t>19.03.2017</a:t>
             </a:fld>
             <a:endParaRPr lang="de-DE"/>
           </a:p>
@@ -5101,7 +5101,7 @@
           <a:p>
             <a:fld id="{CD69044A-C769-4552-8429-3F47D64660A8}" type="datetimeFigureOut">
               <a:rPr lang="de-DE" smtClean="0"/>
-              <a:t>17.03.2017</a:t>
+              <a:t>19.03.2017</a:t>
             </a:fld>
             <a:endParaRPr lang="de-DE"/>
           </a:p>
@@ -5365,7 +5365,7 @@
           <a:p>
             <a:fld id="{CD69044A-C769-4552-8429-3F47D64660A8}" type="datetimeFigureOut">
               <a:rPr lang="de-DE" smtClean="0"/>
-              <a:t>17.03.2017</a:t>
+              <a:t>19.03.2017</a:t>
             </a:fld>
             <a:endParaRPr lang="de-DE"/>
           </a:p>
@@ -5535,7 +5535,7 @@
           <a:p>
             <a:fld id="{CD69044A-C769-4552-8429-3F47D64660A8}" type="datetimeFigureOut">
               <a:rPr lang="de-DE" smtClean="0"/>
-              <a:t>17.03.2017</a:t>
+              <a:t>19.03.2017</a:t>
             </a:fld>
             <a:endParaRPr lang="de-DE"/>
           </a:p>
@@ -5715,7 +5715,7 @@
           <a:p>
             <a:fld id="{CD69044A-C769-4552-8429-3F47D64660A8}" type="datetimeFigureOut">
               <a:rPr lang="de-DE" smtClean="0"/>
-              <a:t>17.03.2017</a:t>
+              <a:t>19.03.2017</a:t>
             </a:fld>
             <a:endParaRPr lang="de-DE"/>
           </a:p>
@@ -5918,7 +5918,7 @@
           <a:p>
             <a:fld id="{CD69044A-C769-4552-8429-3F47D64660A8}" type="datetimeFigureOut">
               <a:rPr lang="de-DE" smtClean="0"/>
-              <a:t>17.03.2017</a:t>
+              <a:t>19.03.2017</a:t>
             </a:fld>
             <a:endParaRPr lang="de-DE"/>
           </a:p>
@@ -6088,7 +6088,7 @@
           <a:p>
             <a:fld id="{CD69044A-C769-4552-8429-3F47D64660A8}" type="datetimeFigureOut">
               <a:rPr lang="de-DE" smtClean="0"/>
-              <a:t>17.03.2017</a:t>
+              <a:t>19.03.2017</a:t>
             </a:fld>
             <a:endParaRPr lang="de-DE"/>
           </a:p>
@@ -6339,7 +6339,7 @@
           <a:p>
             <a:fld id="{CD69044A-C769-4552-8429-3F47D64660A8}" type="datetimeFigureOut">
               <a:rPr lang="de-DE" smtClean="0"/>
-              <a:t>17.03.2017</a:t>
+              <a:t>19.03.2017</a:t>
             </a:fld>
             <a:endParaRPr lang="de-DE"/>
           </a:p>
@@ -6571,7 +6571,7 @@
           <a:p>
             <a:fld id="{CD69044A-C769-4552-8429-3F47D64660A8}" type="datetimeFigureOut">
               <a:rPr lang="de-DE" smtClean="0"/>
-              <a:t>17.03.2017</a:t>
+              <a:t>19.03.2017</a:t>
             </a:fld>
             <a:endParaRPr lang="de-DE"/>
           </a:p>
@@ -6918,7 +6918,7 @@
           <a:p>
             <a:fld id="{CD69044A-C769-4552-8429-3F47D64660A8}" type="datetimeFigureOut">
               <a:rPr lang="de-DE" smtClean="0"/>
-              <a:t>17.03.2017</a:t>
+              <a:t>19.03.2017</a:t>
             </a:fld>
             <a:endParaRPr lang="de-DE"/>
           </a:p>
@@ -7036,7 +7036,7 @@
           <a:p>
             <a:fld id="{CD69044A-C769-4552-8429-3F47D64660A8}" type="datetimeFigureOut">
               <a:rPr lang="de-DE" smtClean="0"/>
-              <a:t>17.03.2017</a:t>
+              <a:t>19.03.2017</a:t>
             </a:fld>
             <a:endParaRPr lang="de-DE"/>
           </a:p>
@@ -7291,7 +7291,7 @@
           <a:p>
             <a:fld id="{CD69044A-C769-4552-8429-3F47D64660A8}" type="datetimeFigureOut">
               <a:rPr lang="de-DE" smtClean="0"/>
-              <a:t>17.03.2017</a:t>
+              <a:t>19.03.2017</a:t>
             </a:fld>
             <a:endParaRPr lang="de-DE"/>
           </a:p>
@@ -7386,7 +7386,7 @@
           <a:p>
             <a:fld id="{CD69044A-C769-4552-8429-3F47D64660A8}" type="datetimeFigureOut">
               <a:rPr lang="de-DE" smtClean="0"/>
-              <a:t>17.03.2017</a:t>
+              <a:t>19.03.2017</a:t>
             </a:fld>
             <a:endParaRPr lang="de-DE"/>
           </a:p>
@@ -7670,7 +7670,7 @@
           <a:p>
             <a:fld id="{CD69044A-C769-4552-8429-3F47D64660A8}" type="datetimeFigureOut">
               <a:rPr lang="de-DE" smtClean="0"/>
-              <a:t>17.03.2017</a:t>
+              <a:t>19.03.2017</a:t>
             </a:fld>
             <a:endParaRPr lang="de-DE"/>
           </a:p>
@@ -7934,7 +7934,7 @@
           <a:p>
             <a:fld id="{CD69044A-C769-4552-8429-3F47D64660A8}" type="datetimeFigureOut">
               <a:rPr lang="de-DE" smtClean="0"/>
-              <a:t>17.03.2017</a:t>
+              <a:t>19.03.2017</a:t>
             </a:fld>
             <a:endParaRPr lang="de-DE"/>
           </a:p>
@@ -8104,7 +8104,7 @@
           <a:p>
             <a:fld id="{CD69044A-C769-4552-8429-3F47D64660A8}" type="datetimeFigureOut">
               <a:rPr lang="de-DE" smtClean="0"/>
-              <a:t>17.03.2017</a:t>
+              <a:t>19.03.2017</a:t>
             </a:fld>
             <a:endParaRPr lang="de-DE"/>
           </a:p>
@@ -8284,7 +8284,7 @@
           <a:p>
             <a:fld id="{CD69044A-C769-4552-8429-3F47D64660A8}" type="datetimeFigureOut">
               <a:rPr lang="de-DE" smtClean="0"/>
-              <a:t>17.03.2017</a:t>
+              <a:t>19.03.2017</a:t>
             </a:fld>
             <a:endParaRPr lang="de-DE"/>
           </a:p>
@@ -8487,7 +8487,7 @@
           <a:p>
             <a:fld id="{CD69044A-C769-4552-8429-3F47D64660A8}" type="datetimeFigureOut">
               <a:rPr lang="de-DE" smtClean="0"/>
-              <a:t>17.03.2017</a:t>
+              <a:t>19.03.2017</a:t>
             </a:fld>
             <a:endParaRPr lang="de-DE"/>
           </a:p>
@@ -8657,7 +8657,7 @@
           <a:p>
             <a:fld id="{CD69044A-C769-4552-8429-3F47D64660A8}" type="datetimeFigureOut">
               <a:rPr lang="de-DE" smtClean="0"/>
-              <a:t>17.03.2017</a:t>
+              <a:t>19.03.2017</a:t>
             </a:fld>
             <a:endParaRPr lang="de-DE"/>
           </a:p>
@@ -8908,7 +8908,7 @@
           <a:p>
             <a:fld id="{CD69044A-C769-4552-8429-3F47D64660A8}" type="datetimeFigureOut">
               <a:rPr lang="de-DE" smtClean="0"/>
-              <a:t>17.03.2017</a:t>
+              <a:t>19.03.2017</a:t>
             </a:fld>
             <a:endParaRPr lang="de-DE"/>
           </a:p>
@@ -9140,7 +9140,7 @@
           <a:p>
             <a:fld id="{CD69044A-C769-4552-8429-3F47D64660A8}" type="datetimeFigureOut">
               <a:rPr lang="de-DE" smtClean="0"/>
-              <a:t>17.03.2017</a:t>
+              <a:t>19.03.2017</a:t>
             </a:fld>
             <a:endParaRPr lang="de-DE"/>
           </a:p>
@@ -9487,7 +9487,7 @@
           <a:p>
             <a:fld id="{CD69044A-C769-4552-8429-3F47D64660A8}" type="datetimeFigureOut">
               <a:rPr lang="de-DE" smtClean="0"/>
-              <a:t>17.03.2017</a:t>
+              <a:t>19.03.2017</a:t>
             </a:fld>
             <a:endParaRPr lang="de-DE"/>
           </a:p>
@@ -9857,7 +9857,7 @@
           <a:p>
             <a:fld id="{CD69044A-C769-4552-8429-3F47D64660A8}" type="datetimeFigureOut">
               <a:rPr lang="de-DE" smtClean="0"/>
-              <a:t>17.03.2017</a:t>
+              <a:t>19.03.2017</a:t>
             </a:fld>
             <a:endParaRPr lang="de-DE"/>
           </a:p>
@@ -9975,7 +9975,7 @@
           <a:p>
             <a:fld id="{CD69044A-C769-4552-8429-3F47D64660A8}" type="datetimeFigureOut">
               <a:rPr lang="de-DE" smtClean="0"/>
-              <a:t>17.03.2017</a:t>
+              <a:t>19.03.2017</a:t>
             </a:fld>
             <a:endParaRPr lang="de-DE"/>
           </a:p>
@@ -10093,7 +10093,7 @@
           <a:p>
             <a:fld id="{CD69044A-C769-4552-8429-3F47D64660A8}" type="datetimeFigureOut">
               <a:rPr lang="de-DE" smtClean="0"/>
-              <a:t>17.03.2017</a:t>
+              <a:t>19.03.2017</a:t>
             </a:fld>
             <a:endParaRPr lang="de-DE"/>
           </a:p>
@@ -10377,7 +10377,7 @@
           <a:p>
             <a:fld id="{CD69044A-C769-4552-8429-3F47D64660A8}" type="datetimeFigureOut">
               <a:rPr lang="de-DE" smtClean="0"/>
-              <a:t>17.03.2017</a:t>
+              <a:t>19.03.2017</a:t>
             </a:fld>
             <a:endParaRPr lang="de-DE"/>
           </a:p>
@@ -10641,7 +10641,7 @@
           <a:p>
             <a:fld id="{CD69044A-C769-4552-8429-3F47D64660A8}" type="datetimeFigureOut">
               <a:rPr lang="de-DE" smtClean="0"/>
-              <a:t>17.03.2017</a:t>
+              <a:t>19.03.2017</a:t>
             </a:fld>
             <a:endParaRPr lang="de-DE"/>
           </a:p>
@@ -10811,7 +10811,7 @@
           <a:p>
             <a:fld id="{CD69044A-C769-4552-8429-3F47D64660A8}" type="datetimeFigureOut">
               <a:rPr lang="de-DE" smtClean="0"/>
-              <a:t>17.03.2017</a:t>
+              <a:t>19.03.2017</a:t>
             </a:fld>
             <a:endParaRPr lang="de-DE"/>
           </a:p>
@@ -10991,7 +10991,7 @@
           <a:p>
             <a:fld id="{CD69044A-C769-4552-8429-3F47D64660A8}" type="datetimeFigureOut">
               <a:rPr lang="de-DE" smtClean="0"/>
-              <a:t>17.03.2017</a:t>
+              <a:t>19.03.2017</a:t>
             </a:fld>
             <a:endParaRPr lang="de-DE"/>
           </a:p>
@@ -11194,7 +11194,7 @@
           <a:p>
             <a:fld id="{CD69044A-C769-4552-8429-3F47D64660A8}" type="datetimeFigureOut">
               <a:rPr lang="de-DE" smtClean="0"/>
-              <a:t>17.03.2017</a:t>
+              <a:t>19.03.2017</a:t>
             </a:fld>
             <a:endParaRPr lang="de-DE"/>
           </a:p>
@@ -11364,7 +11364,7 @@
           <a:p>
             <a:fld id="{CD69044A-C769-4552-8429-3F47D64660A8}" type="datetimeFigureOut">
               <a:rPr lang="de-DE" smtClean="0"/>
-              <a:t>17.03.2017</a:t>
+              <a:t>19.03.2017</a:t>
             </a:fld>
             <a:endParaRPr lang="de-DE"/>
           </a:p>
@@ -11615,7 +11615,7 @@
           <a:p>
             <a:fld id="{CD69044A-C769-4552-8429-3F47D64660A8}" type="datetimeFigureOut">
               <a:rPr lang="de-DE" smtClean="0"/>
-              <a:t>17.03.2017</a:t>
+              <a:t>19.03.2017</a:t>
             </a:fld>
             <a:endParaRPr lang="de-DE"/>
           </a:p>
@@ -11847,7 +11847,7 @@
           <a:p>
             <a:fld id="{CD69044A-C769-4552-8429-3F47D64660A8}" type="datetimeFigureOut">
               <a:rPr lang="de-DE" smtClean="0"/>
-              <a:t>17.03.2017</a:t>
+              <a:t>19.03.2017</a:t>
             </a:fld>
             <a:endParaRPr lang="de-DE"/>
           </a:p>
@@ -11942,7 +11942,7 @@
           <a:p>
             <a:fld id="{CD69044A-C769-4552-8429-3F47D64660A8}" type="datetimeFigureOut">
               <a:rPr lang="de-DE" smtClean="0"/>
-              <a:t>17.03.2017</a:t>
+              <a:t>19.03.2017</a:t>
             </a:fld>
             <a:endParaRPr lang="de-DE"/>
           </a:p>
@@ -12312,7 +12312,7 @@
           <a:p>
             <a:fld id="{CD69044A-C769-4552-8429-3F47D64660A8}" type="datetimeFigureOut">
               <a:rPr lang="de-DE" smtClean="0"/>
-              <a:t>17.03.2017</a:t>
+              <a:t>19.03.2017</a:t>
             </a:fld>
             <a:endParaRPr lang="de-DE"/>
           </a:p>
@@ -12430,7 +12430,7 @@
           <a:p>
             <a:fld id="{CD69044A-C769-4552-8429-3F47D64660A8}" type="datetimeFigureOut">
               <a:rPr lang="de-DE" smtClean="0"/>
-              <a:t>17.03.2017</a:t>
+              <a:t>19.03.2017</a:t>
             </a:fld>
             <a:endParaRPr lang="de-DE"/>
           </a:p>
@@ -12548,7 +12548,7 @@
           <a:p>
             <a:fld id="{CD69044A-C769-4552-8429-3F47D64660A8}" type="datetimeFigureOut">
               <a:rPr lang="de-DE" smtClean="0"/>
-              <a:t>17.03.2017</a:t>
+              <a:t>19.03.2017</a:t>
             </a:fld>
             <a:endParaRPr lang="de-DE"/>
           </a:p>
@@ -12832,7 +12832,7 @@
           <a:p>
             <a:fld id="{CD69044A-C769-4552-8429-3F47D64660A8}" type="datetimeFigureOut">
               <a:rPr lang="de-DE" smtClean="0"/>
-              <a:t>17.03.2017</a:t>
+              <a:t>19.03.2017</a:t>
             </a:fld>
             <a:endParaRPr lang="de-DE"/>
           </a:p>
@@ -13096,7 +13096,7 @@
           <a:p>
             <a:fld id="{CD69044A-C769-4552-8429-3F47D64660A8}" type="datetimeFigureOut">
               <a:rPr lang="de-DE" smtClean="0"/>
-              <a:t>17.03.2017</a:t>
+              <a:t>19.03.2017</a:t>
             </a:fld>
             <a:endParaRPr lang="de-DE"/>
           </a:p>
@@ -13266,7 +13266,7 @@
           <a:p>
             <a:fld id="{CD69044A-C769-4552-8429-3F47D64660A8}" type="datetimeFigureOut">
               <a:rPr lang="de-DE" smtClean="0"/>
-              <a:t>17.03.2017</a:t>
+              <a:t>19.03.2017</a:t>
             </a:fld>
             <a:endParaRPr lang="de-DE"/>
           </a:p>
@@ -13446,7 +13446,7 @@
           <a:p>
             <a:fld id="{CD69044A-C769-4552-8429-3F47D64660A8}" type="datetimeFigureOut">
               <a:rPr lang="de-DE" smtClean="0"/>
-              <a:t>17.03.2017</a:t>
+              <a:t>19.03.2017</a:t>
             </a:fld>
             <a:endParaRPr lang="de-DE"/>
           </a:p>
@@ -13733,7 +13733,7 @@
           <a:p>
             <a:fld id="{CD69044A-C769-4552-8429-3F47D64660A8}" type="datetimeFigureOut">
               <a:rPr lang="de-DE" smtClean="0"/>
-              <a:t>17.03.2017</a:t>
+              <a:t>19.03.2017</a:t>
             </a:fld>
             <a:endParaRPr lang="de-DE"/>
           </a:p>
@@ -13941,7 +13941,7 @@
           <a:p>
             <a:fld id="{CD69044A-C769-4552-8429-3F47D64660A8}" type="datetimeFigureOut">
               <a:rPr lang="de-DE" smtClean="0"/>
-              <a:t>17.03.2017</a:t>
+              <a:t>19.03.2017</a:t>
             </a:fld>
             <a:endParaRPr lang="de-DE"/>
           </a:p>
@@ -14284,7 +14284,7 @@
           <a:p>
             <a:fld id="{CD69044A-C769-4552-8429-3F47D64660A8}" type="datetimeFigureOut">
               <a:rPr lang="de-DE" smtClean="0"/>
-              <a:t>17.03.2017</a:t>
+              <a:t>19.03.2017</a:t>
             </a:fld>
             <a:endParaRPr lang="de-DE"/>
           </a:p>
@@ -14417,7 +14417,7 @@
           <a:p>
             <a:fld id="{CD69044A-C769-4552-8429-3F47D64660A8}" type="datetimeFigureOut">
               <a:rPr lang="de-DE" smtClean="0"/>
-              <a:t>17.03.2017</a:t>
+              <a:t>19.03.2017</a:t>
             </a:fld>
             <a:endParaRPr lang="de-DE"/>
           </a:p>
@@ -14654,7 +14654,7 @@
           <a:p>
             <a:fld id="{CD69044A-C769-4552-8429-3F47D64660A8}" type="datetimeFigureOut">
               <a:rPr lang="de-DE" smtClean="0"/>
-              <a:t>17.03.2017</a:t>
+              <a:t>19.03.2017</a:t>
             </a:fld>
             <a:endParaRPr lang="de-DE"/>
           </a:p>
@@ -15033,7 +15033,7 @@
           <a:p>
             <a:fld id="{CD69044A-C769-4552-8429-3F47D64660A8}" type="datetimeFigureOut">
               <a:rPr lang="de-DE" smtClean="0"/>
-              <a:t>17.03.2017</a:t>
+              <a:t>19.03.2017</a:t>
             </a:fld>
             <a:endParaRPr lang="de-DE"/>
           </a:p>
@@ -15151,7 +15151,7 @@
           <a:p>
             <a:fld id="{CD69044A-C769-4552-8429-3F47D64660A8}" type="datetimeFigureOut">
               <a:rPr lang="de-DE" smtClean="0"/>
-              <a:t>17.03.2017</a:t>
+              <a:t>19.03.2017</a:t>
             </a:fld>
             <a:endParaRPr lang="de-DE"/>
           </a:p>
@@ -15322,7 +15322,7 @@
           <a:p>
             <a:fld id="{CD69044A-C769-4552-8429-3F47D64660A8}" type="datetimeFigureOut">
               <a:rPr lang="de-DE" smtClean="0"/>
-              <a:t>17.03.2017</a:t>
+              <a:t>19.03.2017</a:t>
             </a:fld>
             <a:endParaRPr lang="de-DE"/>
           </a:p>
@@ -15676,7 +15676,7 @@
           <a:p>
             <a:fld id="{CD69044A-C769-4552-8429-3F47D64660A8}" type="datetimeFigureOut">
               <a:rPr lang="de-DE" smtClean="0"/>
-              <a:t>17.03.2017</a:t>
+              <a:t>19.03.2017</a:t>
             </a:fld>
             <a:endParaRPr lang="de-DE"/>
           </a:p>
@@ -16058,7 +16058,7 @@
           <a:p>
             <a:fld id="{CD69044A-C769-4552-8429-3F47D64660A8}" type="datetimeFigureOut">
               <a:rPr lang="de-DE" smtClean="0"/>
-              <a:t>17.03.2017</a:t>
+              <a:t>19.03.2017</a:t>
             </a:fld>
             <a:endParaRPr lang="de-DE"/>
           </a:p>
@@ -16228,7 +16228,7 @@
           <a:p>
             <a:fld id="{CD69044A-C769-4552-8429-3F47D64660A8}" type="datetimeFigureOut">
               <a:rPr lang="de-DE" smtClean="0"/>
-              <a:t>17.03.2017</a:t>
+              <a:t>19.03.2017</a:t>
             </a:fld>
             <a:endParaRPr lang="de-DE"/>
           </a:p>
@@ -16484,7 +16484,7 @@
           <a:p>
             <a:fld id="{CD69044A-C769-4552-8429-3F47D64660A8}" type="datetimeFigureOut">
               <a:rPr lang="de-DE" smtClean="0"/>
-              <a:t>17.03.2017</a:t>
+              <a:t>19.03.2017</a:t>
             </a:fld>
             <a:endParaRPr lang="de-DE"/>
           </a:p>
@@ -16768,7 +16768,7 @@
           <a:p>
             <a:fld id="{CD69044A-C769-4552-8429-3F47D64660A8}" type="datetimeFigureOut">
               <a:rPr lang="de-DE" smtClean="0"/>
-              <a:t>17.03.2017</a:t>
+              <a:t>19.03.2017</a:t>
             </a:fld>
             <a:endParaRPr lang="de-DE"/>
           </a:p>
@@ -17032,7 +17032,7 @@
           <a:p>
             <a:fld id="{CD69044A-C769-4552-8429-3F47D64660A8}" type="datetimeFigureOut">
               <a:rPr lang="de-DE" smtClean="0"/>
-              <a:t>17.03.2017</a:t>
+              <a:t>19.03.2017</a:t>
             </a:fld>
             <a:endParaRPr lang="de-DE"/>
           </a:p>
@@ -17246,7 +17246,7 @@
           <a:p>
             <a:fld id="{CD69044A-C769-4552-8429-3F47D64660A8}" type="datetimeFigureOut">
               <a:rPr lang="de-DE" smtClean="0"/>
-              <a:t>17.03.2017</a:t>
+              <a:t>19.03.2017</a:t>
             </a:fld>
             <a:endParaRPr lang="de-DE"/>
           </a:p>
@@ -17776,7 +17776,7 @@
           <a:p>
             <a:fld id="{CD69044A-C769-4552-8429-3F47D64660A8}" type="datetimeFigureOut">
               <a:rPr lang="de-DE" smtClean="0"/>
-              <a:t>17.03.2017</a:t>
+              <a:t>19.03.2017</a:t>
             </a:fld>
             <a:endParaRPr lang="de-DE"/>
           </a:p>
@@ -18306,7 +18306,7 @@
           <a:p>
             <a:fld id="{CD69044A-C769-4552-8429-3F47D64660A8}" type="datetimeFigureOut">
               <a:rPr lang="de-DE" smtClean="0"/>
-              <a:t>17.03.2017</a:t>
+              <a:t>19.03.2017</a:t>
             </a:fld>
             <a:endParaRPr lang="de-DE"/>
           </a:p>
@@ -18836,7 +18836,7 @@
           <a:p>
             <a:fld id="{CD69044A-C769-4552-8429-3F47D64660A8}" type="datetimeFigureOut">
               <a:rPr lang="de-DE" smtClean="0"/>
-              <a:t>17.03.2017</a:t>
+              <a:t>19.03.2017</a:t>
             </a:fld>
             <a:endParaRPr lang="de-DE"/>
           </a:p>
@@ -19366,7 +19366,7 @@
           <a:p>
             <a:fld id="{CD69044A-C769-4552-8429-3F47D64660A8}" type="datetimeFigureOut">
               <a:rPr lang="de-DE" smtClean="0"/>
-              <a:t>17.03.2017</a:t>
+              <a:t>19.03.2017</a:t>
             </a:fld>
             <a:endParaRPr lang="de-DE"/>
           </a:p>
@@ -19896,7 +19896,7 @@
           <a:p>
             <a:fld id="{CD69044A-C769-4552-8429-3F47D64660A8}" type="datetimeFigureOut">
               <a:rPr lang="de-DE" smtClean="0"/>
-              <a:t>17.03.2017</a:t>
+              <a:t>19.03.2017</a:t>
             </a:fld>
             <a:endParaRPr lang="de-DE"/>
           </a:p>
@@ -20499,7 +20499,7 @@
           <a:p>
             <a:fld id="{CD69044A-C769-4552-8429-3F47D64660A8}" type="datetimeFigureOut">
               <a:rPr lang="de-DE" smtClean="0"/>
-              <a:t>17.03.2017</a:t>
+              <a:t>19.03.2017</a:t>
             </a:fld>
             <a:endParaRPr lang="de-DE"/>
           </a:p>
@@ -22830,7 +22830,7 @@
         </p:blipFill>
         <p:spPr>
           <a:xfrm>
-            <a:off x="2402591" y="1886746"/>
+            <a:off x="2974090" y="2495757"/>
             <a:ext cx="1143000" cy="1143000"/>
           </a:xfrm>
           <a:prstGeom prst="rect">
@@ -22860,7 +22860,7 @@
         </p:blipFill>
         <p:spPr>
           <a:xfrm>
-            <a:off x="972940" y="3628509"/>
+            <a:off x="999131" y="3813801"/>
             <a:ext cx="1860359" cy="517412"/>
           </a:xfrm>
           <a:prstGeom prst="rect">
@@ -22890,7 +22890,7 @@
         </p:blipFill>
         <p:spPr>
           <a:xfrm>
-            <a:off x="5767944" y="1836665"/>
+            <a:off x="4648951" y="1885951"/>
             <a:ext cx="1142025" cy="1294723"/>
           </a:xfrm>
           <a:prstGeom prst="rect">
@@ -22920,7 +22920,7 @@
         </p:blipFill>
         <p:spPr>
           <a:xfrm>
-            <a:off x="5339231" y="4761153"/>
+            <a:off x="4648950" y="4609823"/>
             <a:ext cx="1999450" cy="680085"/>
           </a:xfrm>
           <a:prstGeom prst="rect">
@@ -22950,7 +22950,7 @@
         </p:blipFill>
         <p:spPr>
           <a:xfrm>
-            <a:off x="2206122" y="4733296"/>
+            <a:off x="3187104" y="5368176"/>
             <a:ext cx="1535937" cy="735798"/>
           </a:xfrm>
           <a:prstGeom prst="rect">
@@ -22980,7 +22980,7 @@
         </p:blipFill>
         <p:spPr>
           <a:xfrm>
-            <a:off x="6590162" y="3180674"/>
+            <a:off x="6408214" y="3387627"/>
             <a:ext cx="2271713" cy="1135856"/>
           </a:xfrm>
           <a:prstGeom prst="rect">
@@ -23010,8 +23010,128 @@
         </p:blipFill>
         <p:spPr>
           <a:xfrm>
-            <a:off x="4021549" y="3338034"/>
+            <a:off x="4049743" y="3638757"/>
             <a:ext cx="1198415" cy="994241"/>
+          </a:xfrm>
+          <a:prstGeom prst="rect">
+            <a:avLst/>
+          </a:prstGeom>
+        </p:spPr>
+      </p:pic>
+      <p:pic>
+        <p:nvPicPr>
+          <p:cNvPr id="11" name="Grafik 10"/>
+          <p:cNvPicPr>
+            <a:picLocks noChangeAspect="1"/>
+          </p:cNvPicPr>
+          <p:nvPr/>
+        </p:nvPicPr>
+        <p:blipFill>
+          <a:blip r:embed="rId9">
+            <a:extLst>
+              <a:ext uri="{28A0092B-C50C-407E-A947-70E740481C1C}">
+                <a14:useLocalDpi xmlns:a14="http://schemas.microsoft.com/office/drawing/2010/main" val="0"/>
+              </a:ext>
+            </a:extLst>
+          </a:blip>
+          <a:stretch>
+            <a:fillRect/>
+          </a:stretch>
+        </p:blipFill>
+        <p:spPr>
+          <a:xfrm>
+            <a:off x="6648399" y="1914740"/>
+            <a:ext cx="1960635" cy="816932"/>
+          </a:xfrm>
+          <a:prstGeom prst="rect">
+            <a:avLst/>
+          </a:prstGeom>
+        </p:spPr>
+      </p:pic>
+      <p:pic>
+        <p:nvPicPr>
+          <p:cNvPr id="13" name="Grafik 12"/>
+          <p:cNvPicPr>
+            <a:picLocks noChangeAspect="1"/>
+          </p:cNvPicPr>
+          <p:nvPr/>
+        </p:nvPicPr>
+        <p:blipFill>
+          <a:blip r:embed="rId10">
+            <a:extLst>
+              <a:ext uri="{28A0092B-C50C-407E-A947-70E740481C1C}">
+                <a14:useLocalDpi xmlns:a14="http://schemas.microsoft.com/office/drawing/2010/main" val="0"/>
+              </a:ext>
+            </a:extLst>
+          </a:blip>
+          <a:stretch>
+            <a:fillRect/>
+          </a:stretch>
+        </p:blipFill>
+        <p:spPr>
+          <a:xfrm>
+            <a:off x="999131" y="4949866"/>
+            <a:ext cx="1379494" cy="1037424"/>
+          </a:xfrm>
+          <a:prstGeom prst="rect">
+            <a:avLst/>
+          </a:prstGeom>
+        </p:spPr>
+      </p:pic>
+      <p:pic>
+        <p:nvPicPr>
+          <p:cNvPr id="15" name="Grafik 14"/>
+          <p:cNvPicPr>
+            <a:picLocks noChangeAspect="1"/>
+          </p:cNvPicPr>
+          <p:nvPr/>
+        </p:nvPicPr>
+        <p:blipFill>
+          <a:blip r:embed="rId11">
+            <a:extLst>
+              <a:ext uri="{28A0092B-C50C-407E-A947-70E740481C1C}">
+                <a14:useLocalDpi xmlns:a14="http://schemas.microsoft.com/office/drawing/2010/main" val="0"/>
+              </a:ext>
+            </a:extLst>
+          </a:blip>
+          <a:stretch>
+            <a:fillRect/>
+          </a:stretch>
+        </p:blipFill>
+        <p:spPr>
+          <a:xfrm>
+            <a:off x="1002328" y="1914739"/>
+            <a:ext cx="1333500" cy="904875"/>
+          </a:xfrm>
+          <a:prstGeom prst="rect">
+            <a:avLst/>
+          </a:prstGeom>
+        </p:spPr>
+      </p:pic>
+      <p:pic>
+        <p:nvPicPr>
+          <p:cNvPr id="17" name="Grafik 16"/>
+          <p:cNvPicPr>
+            <a:picLocks noChangeAspect="1"/>
+          </p:cNvPicPr>
+          <p:nvPr/>
+        </p:nvPicPr>
+        <p:blipFill>
+          <a:blip r:embed="rId12">
+            <a:extLst>
+              <a:ext uri="{28A0092B-C50C-407E-A947-70E740481C1C}">
+                <a14:useLocalDpi xmlns:a14="http://schemas.microsoft.com/office/drawing/2010/main" val="0"/>
+              </a:ext>
+            </a:extLst>
+          </a:blip>
+          <a:stretch>
+            <a:fillRect/>
+          </a:stretch>
+        </p:blipFill>
+        <p:spPr>
+          <a:xfrm>
+            <a:off x="6945611" y="4949866"/>
+            <a:ext cx="1734316" cy="1154108"/>
           </a:xfrm>
           <a:prstGeom prst="rect">
             <a:avLst/>

</xml_diff>

<commit_message>
fixed a not aligned line
</commit_message>
<xml_diff>
--- a/Abschlusspräsentation/Abschlusspräsentation.pptx
+++ b/Abschlusspräsentation/Abschlusspräsentation.pptx
@@ -270,7 +270,7 @@
           <a:p>
             <a:fld id="{CD69044A-C769-4552-8429-3F47D64660A8}" type="datetimeFigureOut">
               <a:rPr lang="de-DE" smtClean="0"/>
-              <a:t>19.03.2017</a:t>
+              <a:t>20.03.2017</a:t>
             </a:fld>
             <a:endParaRPr lang="de-DE"/>
           </a:p>
@@ -440,7 +440,7 @@
           <a:p>
             <a:fld id="{CD69044A-C769-4552-8429-3F47D64660A8}" type="datetimeFigureOut">
               <a:rPr lang="de-DE" smtClean="0"/>
-              <a:t>19.03.2017</a:t>
+              <a:t>20.03.2017</a:t>
             </a:fld>
             <a:endParaRPr lang="de-DE"/>
           </a:p>
@@ -620,7 +620,7 @@
           <a:p>
             <a:fld id="{CD69044A-C769-4552-8429-3F47D64660A8}" type="datetimeFigureOut">
               <a:rPr lang="de-DE" smtClean="0"/>
-              <a:t>19.03.2017</a:t>
+              <a:t>20.03.2017</a:t>
             </a:fld>
             <a:endParaRPr lang="de-DE"/>
           </a:p>
@@ -823,7 +823,7 @@
           <a:p>
             <a:fld id="{CD69044A-C769-4552-8429-3F47D64660A8}" type="datetimeFigureOut">
               <a:rPr lang="de-DE" smtClean="0"/>
-              <a:t>19.03.2017</a:t>
+              <a:t>20.03.2017</a:t>
             </a:fld>
             <a:endParaRPr lang="de-DE"/>
           </a:p>
@@ -993,7 +993,7 @@
           <a:p>
             <a:fld id="{CD69044A-C769-4552-8429-3F47D64660A8}" type="datetimeFigureOut">
               <a:rPr lang="de-DE" smtClean="0"/>
-              <a:t>19.03.2017</a:t>
+              <a:t>20.03.2017</a:t>
             </a:fld>
             <a:endParaRPr lang="de-DE"/>
           </a:p>
@@ -1244,7 +1244,7 @@
           <a:p>
             <a:fld id="{CD69044A-C769-4552-8429-3F47D64660A8}" type="datetimeFigureOut">
               <a:rPr lang="de-DE" smtClean="0"/>
-              <a:t>19.03.2017</a:t>
+              <a:t>20.03.2017</a:t>
             </a:fld>
             <a:endParaRPr lang="de-DE"/>
           </a:p>
@@ -1476,7 +1476,7 @@
           <a:p>
             <a:fld id="{CD69044A-C769-4552-8429-3F47D64660A8}" type="datetimeFigureOut">
               <a:rPr lang="de-DE" smtClean="0"/>
-              <a:t>19.03.2017</a:t>
+              <a:t>20.03.2017</a:t>
             </a:fld>
             <a:endParaRPr lang="de-DE"/>
           </a:p>
@@ -1823,7 +1823,7 @@
           <a:p>
             <a:fld id="{CD69044A-C769-4552-8429-3F47D64660A8}" type="datetimeFigureOut">
               <a:rPr lang="de-DE" smtClean="0"/>
-              <a:t>19.03.2017</a:t>
+              <a:t>20.03.2017</a:t>
             </a:fld>
             <a:endParaRPr lang="de-DE"/>
           </a:p>
@@ -1941,7 +1941,7 @@
           <a:p>
             <a:fld id="{CD69044A-C769-4552-8429-3F47D64660A8}" type="datetimeFigureOut">
               <a:rPr lang="de-DE" smtClean="0"/>
-              <a:t>19.03.2017</a:t>
+              <a:t>20.03.2017</a:t>
             </a:fld>
             <a:endParaRPr lang="de-DE"/>
           </a:p>
@@ -2059,7 +2059,7 @@
           <a:p>
             <a:fld id="{CD69044A-C769-4552-8429-3F47D64660A8}" type="datetimeFigureOut">
               <a:rPr lang="de-DE" smtClean="0"/>
-              <a:t>19.03.2017</a:t>
+              <a:t>20.03.2017</a:t>
             </a:fld>
             <a:endParaRPr lang="de-DE"/>
           </a:p>
@@ -2343,7 +2343,7 @@
           <a:p>
             <a:fld id="{CD69044A-C769-4552-8429-3F47D64660A8}" type="datetimeFigureOut">
               <a:rPr lang="de-DE" smtClean="0"/>
-              <a:t>19.03.2017</a:t>
+              <a:t>20.03.2017</a:t>
             </a:fld>
             <a:endParaRPr lang="de-DE"/>
           </a:p>
@@ -2513,7 +2513,7 @@
           <a:p>
             <a:fld id="{CD69044A-C769-4552-8429-3F47D64660A8}" type="datetimeFigureOut">
               <a:rPr lang="de-DE" smtClean="0"/>
-              <a:t>19.03.2017</a:t>
+              <a:t>20.03.2017</a:t>
             </a:fld>
             <a:endParaRPr lang="de-DE"/>
           </a:p>
@@ -2777,7 +2777,7 @@
           <a:p>
             <a:fld id="{CD69044A-C769-4552-8429-3F47D64660A8}" type="datetimeFigureOut">
               <a:rPr lang="de-DE" smtClean="0"/>
-              <a:t>19.03.2017</a:t>
+              <a:t>20.03.2017</a:t>
             </a:fld>
             <a:endParaRPr lang="de-DE"/>
           </a:p>
@@ -2947,7 +2947,7 @@
           <a:p>
             <a:fld id="{CD69044A-C769-4552-8429-3F47D64660A8}" type="datetimeFigureOut">
               <a:rPr lang="de-DE" smtClean="0"/>
-              <a:t>19.03.2017</a:t>
+              <a:t>20.03.2017</a:t>
             </a:fld>
             <a:endParaRPr lang="de-DE"/>
           </a:p>
@@ -3127,7 +3127,7 @@
           <a:p>
             <a:fld id="{CD69044A-C769-4552-8429-3F47D64660A8}" type="datetimeFigureOut">
               <a:rPr lang="de-DE" smtClean="0"/>
-              <a:t>19.03.2017</a:t>
+              <a:t>20.03.2017</a:t>
             </a:fld>
             <a:endParaRPr lang="de-DE"/>
           </a:p>
@@ -3330,7 +3330,7 @@
           <a:p>
             <a:fld id="{CD69044A-C769-4552-8429-3F47D64660A8}" type="datetimeFigureOut">
               <a:rPr lang="de-DE" smtClean="0"/>
-              <a:t>19.03.2017</a:t>
+              <a:t>20.03.2017</a:t>
             </a:fld>
             <a:endParaRPr lang="de-DE"/>
           </a:p>
@@ -3500,7 +3500,7 @@
           <a:p>
             <a:fld id="{CD69044A-C769-4552-8429-3F47D64660A8}" type="datetimeFigureOut">
               <a:rPr lang="de-DE" smtClean="0"/>
-              <a:t>19.03.2017</a:t>
+              <a:t>20.03.2017</a:t>
             </a:fld>
             <a:endParaRPr lang="de-DE"/>
           </a:p>
@@ -3751,7 +3751,7 @@
           <a:p>
             <a:fld id="{CD69044A-C769-4552-8429-3F47D64660A8}" type="datetimeFigureOut">
               <a:rPr lang="de-DE" smtClean="0"/>
-              <a:t>19.03.2017</a:t>
+              <a:t>20.03.2017</a:t>
             </a:fld>
             <a:endParaRPr lang="de-DE"/>
           </a:p>
@@ -3983,7 +3983,7 @@
           <a:p>
             <a:fld id="{CD69044A-C769-4552-8429-3F47D64660A8}" type="datetimeFigureOut">
               <a:rPr lang="de-DE" smtClean="0"/>
-              <a:t>19.03.2017</a:t>
+              <a:t>20.03.2017</a:t>
             </a:fld>
             <a:endParaRPr lang="de-DE"/>
           </a:p>
@@ -4330,7 +4330,7 @@
           <a:p>
             <a:fld id="{CD69044A-C769-4552-8429-3F47D64660A8}" type="datetimeFigureOut">
               <a:rPr lang="de-DE" smtClean="0"/>
-              <a:t>19.03.2017</a:t>
+              <a:t>20.03.2017</a:t>
             </a:fld>
             <a:endParaRPr lang="de-DE"/>
           </a:p>
@@ -4448,7 +4448,7 @@
           <a:p>
             <a:fld id="{CD69044A-C769-4552-8429-3F47D64660A8}" type="datetimeFigureOut">
               <a:rPr lang="de-DE" smtClean="0"/>
-              <a:t>19.03.2017</a:t>
+              <a:t>20.03.2017</a:t>
             </a:fld>
             <a:endParaRPr lang="de-DE"/>
           </a:p>
@@ -4566,7 +4566,7 @@
           <a:p>
             <a:fld id="{CD69044A-C769-4552-8429-3F47D64660A8}" type="datetimeFigureOut">
               <a:rPr lang="de-DE" smtClean="0"/>
-              <a:t>19.03.2017</a:t>
+              <a:t>20.03.2017</a:t>
             </a:fld>
             <a:endParaRPr lang="de-DE"/>
           </a:p>
@@ -4817,7 +4817,7 @@
           <a:p>
             <a:fld id="{CD69044A-C769-4552-8429-3F47D64660A8}" type="datetimeFigureOut">
               <a:rPr lang="de-DE" smtClean="0"/>
-              <a:t>19.03.2017</a:t>
+              <a:t>20.03.2017</a:t>
             </a:fld>
             <a:endParaRPr lang="de-DE"/>
           </a:p>
@@ -5101,7 +5101,7 @@
           <a:p>
             <a:fld id="{CD69044A-C769-4552-8429-3F47D64660A8}" type="datetimeFigureOut">
               <a:rPr lang="de-DE" smtClean="0"/>
-              <a:t>19.03.2017</a:t>
+              <a:t>20.03.2017</a:t>
             </a:fld>
             <a:endParaRPr lang="de-DE"/>
           </a:p>
@@ -5365,7 +5365,7 @@
           <a:p>
             <a:fld id="{CD69044A-C769-4552-8429-3F47D64660A8}" type="datetimeFigureOut">
               <a:rPr lang="de-DE" smtClean="0"/>
-              <a:t>19.03.2017</a:t>
+              <a:t>20.03.2017</a:t>
             </a:fld>
             <a:endParaRPr lang="de-DE"/>
           </a:p>
@@ -5535,7 +5535,7 @@
           <a:p>
             <a:fld id="{CD69044A-C769-4552-8429-3F47D64660A8}" type="datetimeFigureOut">
               <a:rPr lang="de-DE" smtClean="0"/>
-              <a:t>19.03.2017</a:t>
+              <a:t>20.03.2017</a:t>
             </a:fld>
             <a:endParaRPr lang="de-DE"/>
           </a:p>
@@ -5715,7 +5715,7 @@
           <a:p>
             <a:fld id="{CD69044A-C769-4552-8429-3F47D64660A8}" type="datetimeFigureOut">
               <a:rPr lang="de-DE" smtClean="0"/>
-              <a:t>19.03.2017</a:t>
+              <a:t>20.03.2017</a:t>
             </a:fld>
             <a:endParaRPr lang="de-DE"/>
           </a:p>
@@ -5918,7 +5918,7 @@
           <a:p>
             <a:fld id="{CD69044A-C769-4552-8429-3F47D64660A8}" type="datetimeFigureOut">
               <a:rPr lang="de-DE" smtClean="0"/>
-              <a:t>19.03.2017</a:t>
+              <a:t>20.03.2017</a:t>
             </a:fld>
             <a:endParaRPr lang="de-DE"/>
           </a:p>
@@ -6088,7 +6088,7 @@
           <a:p>
             <a:fld id="{CD69044A-C769-4552-8429-3F47D64660A8}" type="datetimeFigureOut">
               <a:rPr lang="de-DE" smtClean="0"/>
-              <a:t>19.03.2017</a:t>
+              <a:t>20.03.2017</a:t>
             </a:fld>
             <a:endParaRPr lang="de-DE"/>
           </a:p>
@@ -6339,7 +6339,7 @@
           <a:p>
             <a:fld id="{CD69044A-C769-4552-8429-3F47D64660A8}" type="datetimeFigureOut">
               <a:rPr lang="de-DE" smtClean="0"/>
-              <a:t>19.03.2017</a:t>
+              <a:t>20.03.2017</a:t>
             </a:fld>
             <a:endParaRPr lang="de-DE"/>
           </a:p>
@@ -6571,7 +6571,7 @@
           <a:p>
             <a:fld id="{CD69044A-C769-4552-8429-3F47D64660A8}" type="datetimeFigureOut">
               <a:rPr lang="de-DE" smtClean="0"/>
-              <a:t>19.03.2017</a:t>
+              <a:t>20.03.2017</a:t>
             </a:fld>
             <a:endParaRPr lang="de-DE"/>
           </a:p>
@@ -6918,7 +6918,7 @@
           <a:p>
             <a:fld id="{CD69044A-C769-4552-8429-3F47D64660A8}" type="datetimeFigureOut">
               <a:rPr lang="de-DE" smtClean="0"/>
-              <a:t>19.03.2017</a:t>
+              <a:t>20.03.2017</a:t>
             </a:fld>
             <a:endParaRPr lang="de-DE"/>
           </a:p>
@@ -7036,7 +7036,7 @@
           <a:p>
             <a:fld id="{CD69044A-C769-4552-8429-3F47D64660A8}" type="datetimeFigureOut">
               <a:rPr lang="de-DE" smtClean="0"/>
-              <a:t>19.03.2017</a:t>
+              <a:t>20.03.2017</a:t>
             </a:fld>
             <a:endParaRPr lang="de-DE"/>
           </a:p>
@@ -7291,7 +7291,7 @@
           <a:p>
             <a:fld id="{CD69044A-C769-4552-8429-3F47D64660A8}" type="datetimeFigureOut">
               <a:rPr lang="de-DE" smtClean="0"/>
-              <a:t>19.03.2017</a:t>
+              <a:t>20.03.2017</a:t>
             </a:fld>
             <a:endParaRPr lang="de-DE"/>
           </a:p>
@@ -7386,7 +7386,7 @@
           <a:p>
             <a:fld id="{CD69044A-C769-4552-8429-3F47D64660A8}" type="datetimeFigureOut">
               <a:rPr lang="de-DE" smtClean="0"/>
-              <a:t>19.03.2017</a:t>
+              <a:t>20.03.2017</a:t>
             </a:fld>
             <a:endParaRPr lang="de-DE"/>
           </a:p>
@@ -7670,7 +7670,7 @@
           <a:p>
             <a:fld id="{CD69044A-C769-4552-8429-3F47D64660A8}" type="datetimeFigureOut">
               <a:rPr lang="de-DE" smtClean="0"/>
-              <a:t>19.03.2017</a:t>
+              <a:t>20.03.2017</a:t>
             </a:fld>
             <a:endParaRPr lang="de-DE"/>
           </a:p>
@@ -7934,7 +7934,7 @@
           <a:p>
             <a:fld id="{CD69044A-C769-4552-8429-3F47D64660A8}" type="datetimeFigureOut">
               <a:rPr lang="de-DE" smtClean="0"/>
-              <a:t>19.03.2017</a:t>
+              <a:t>20.03.2017</a:t>
             </a:fld>
             <a:endParaRPr lang="de-DE"/>
           </a:p>
@@ -8104,7 +8104,7 @@
           <a:p>
             <a:fld id="{CD69044A-C769-4552-8429-3F47D64660A8}" type="datetimeFigureOut">
               <a:rPr lang="de-DE" smtClean="0"/>
-              <a:t>19.03.2017</a:t>
+              <a:t>20.03.2017</a:t>
             </a:fld>
             <a:endParaRPr lang="de-DE"/>
           </a:p>
@@ -8284,7 +8284,7 @@
           <a:p>
             <a:fld id="{CD69044A-C769-4552-8429-3F47D64660A8}" type="datetimeFigureOut">
               <a:rPr lang="de-DE" smtClean="0"/>
-              <a:t>19.03.2017</a:t>
+              <a:t>20.03.2017</a:t>
             </a:fld>
             <a:endParaRPr lang="de-DE"/>
           </a:p>
@@ -8487,7 +8487,7 @@
           <a:p>
             <a:fld id="{CD69044A-C769-4552-8429-3F47D64660A8}" type="datetimeFigureOut">
               <a:rPr lang="de-DE" smtClean="0"/>
-              <a:t>19.03.2017</a:t>
+              <a:t>20.03.2017</a:t>
             </a:fld>
             <a:endParaRPr lang="de-DE"/>
           </a:p>
@@ -8657,7 +8657,7 @@
           <a:p>
             <a:fld id="{CD69044A-C769-4552-8429-3F47D64660A8}" type="datetimeFigureOut">
               <a:rPr lang="de-DE" smtClean="0"/>
-              <a:t>19.03.2017</a:t>
+              <a:t>20.03.2017</a:t>
             </a:fld>
             <a:endParaRPr lang="de-DE"/>
           </a:p>
@@ -8908,7 +8908,7 @@
           <a:p>
             <a:fld id="{CD69044A-C769-4552-8429-3F47D64660A8}" type="datetimeFigureOut">
               <a:rPr lang="de-DE" smtClean="0"/>
-              <a:t>19.03.2017</a:t>
+              <a:t>20.03.2017</a:t>
             </a:fld>
             <a:endParaRPr lang="de-DE"/>
           </a:p>
@@ -9140,7 +9140,7 @@
           <a:p>
             <a:fld id="{CD69044A-C769-4552-8429-3F47D64660A8}" type="datetimeFigureOut">
               <a:rPr lang="de-DE" smtClean="0"/>
-              <a:t>19.03.2017</a:t>
+              <a:t>20.03.2017</a:t>
             </a:fld>
             <a:endParaRPr lang="de-DE"/>
           </a:p>
@@ -9487,7 +9487,7 @@
           <a:p>
             <a:fld id="{CD69044A-C769-4552-8429-3F47D64660A8}" type="datetimeFigureOut">
               <a:rPr lang="de-DE" smtClean="0"/>
-              <a:t>19.03.2017</a:t>
+              <a:t>20.03.2017</a:t>
             </a:fld>
             <a:endParaRPr lang="de-DE"/>
           </a:p>
@@ -9857,7 +9857,7 @@
           <a:p>
             <a:fld id="{CD69044A-C769-4552-8429-3F47D64660A8}" type="datetimeFigureOut">
               <a:rPr lang="de-DE" smtClean="0"/>
-              <a:t>19.03.2017</a:t>
+              <a:t>20.03.2017</a:t>
             </a:fld>
             <a:endParaRPr lang="de-DE"/>
           </a:p>
@@ -9975,7 +9975,7 @@
           <a:p>
             <a:fld id="{CD69044A-C769-4552-8429-3F47D64660A8}" type="datetimeFigureOut">
               <a:rPr lang="de-DE" smtClean="0"/>
-              <a:t>19.03.2017</a:t>
+              <a:t>20.03.2017</a:t>
             </a:fld>
             <a:endParaRPr lang="de-DE"/>
           </a:p>
@@ -10093,7 +10093,7 @@
           <a:p>
             <a:fld id="{CD69044A-C769-4552-8429-3F47D64660A8}" type="datetimeFigureOut">
               <a:rPr lang="de-DE" smtClean="0"/>
-              <a:t>19.03.2017</a:t>
+              <a:t>20.03.2017</a:t>
             </a:fld>
             <a:endParaRPr lang="de-DE"/>
           </a:p>
@@ -10377,7 +10377,7 @@
           <a:p>
             <a:fld id="{CD69044A-C769-4552-8429-3F47D64660A8}" type="datetimeFigureOut">
               <a:rPr lang="de-DE" smtClean="0"/>
-              <a:t>19.03.2017</a:t>
+              <a:t>20.03.2017</a:t>
             </a:fld>
             <a:endParaRPr lang="de-DE"/>
           </a:p>
@@ -10641,7 +10641,7 @@
           <a:p>
             <a:fld id="{CD69044A-C769-4552-8429-3F47D64660A8}" type="datetimeFigureOut">
               <a:rPr lang="de-DE" smtClean="0"/>
-              <a:t>19.03.2017</a:t>
+              <a:t>20.03.2017</a:t>
             </a:fld>
             <a:endParaRPr lang="de-DE"/>
           </a:p>
@@ -10811,7 +10811,7 @@
           <a:p>
             <a:fld id="{CD69044A-C769-4552-8429-3F47D64660A8}" type="datetimeFigureOut">
               <a:rPr lang="de-DE" smtClean="0"/>
-              <a:t>19.03.2017</a:t>
+              <a:t>20.03.2017</a:t>
             </a:fld>
             <a:endParaRPr lang="de-DE"/>
           </a:p>
@@ -10991,7 +10991,7 @@
           <a:p>
             <a:fld id="{CD69044A-C769-4552-8429-3F47D64660A8}" type="datetimeFigureOut">
               <a:rPr lang="de-DE" smtClean="0"/>
-              <a:t>19.03.2017</a:t>
+              <a:t>20.03.2017</a:t>
             </a:fld>
             <a:endParaRPr lang="de-DE"/>
           </a:p>
@@ -11194,7 +11194,7 @@
           <a:p>
             <a:fld id="{CD69044A-C769-4552-8429-3F47D64660A8}" type="datetimeFigureOut">
               <a:rPr lang="de-DE" smtClean="0"/>
-              <a:t>19.03.2017</a:t>
+              <a:t>20.03.2017</a:t>
             </a:fld>
             <a:endParaRPr lang="de-DE"/>
           </a:p>
@@ -11364,7 +11364,7 @@
           <a:p>
             <a:fld id="{CD69044A-C769-4552-8429-3F47D64660A8}" type="datetimeFigureOut">
               <a:rPr lang="de-DE" smtClean="0"/>
-              <a:t>19.03.2017</a:t>
+              <a:t>20.03.2017</a:t>
             </a:fld>
             <a:endParaRPr lang="de-DE"/>
           </a:p>
@@ -11615,7 +11615,7 @@
           <a:p>
             <a:fld id="{CD69044A-C769-4552-8429-3F47D64660A8}" type="datetimeFigureOut">
               <a:rPr lang="de-DE" smtClean="0"/>
-              <a:t>19.03.2017</a:t>
+              <a:t>20.03.2017</a:t>
             </a:fld>
             <a:endParaRPr lang="de-DE"/>
           </a:p>
@@ -11847,7 +11847,7 @@
           <a:p>
             <a:fld id="{CD69044A-C769-4552-8429-3F47D64660A8}" type="datetimeFigureOut">
               <a:rPr lang="de-DE" smtClean="0"/>
-              <a:t>19.03.2017</a:t>
+              <a:t>20.03.2017</a:t>
             </a:fld>
             <a:endParaRPr lang="de-DE"/>
           </a:p>
@@ -11942,7 +11942,7 @@
           <a:p>
             <a:fld id="{CD69044A-C769-4552-8429-3F47D64660A8}" type="datetimeFigureOut">
               <a:rPr lang="de-DE" smtClean="0"/>
-              <a:t>19.03.2017</a:t>
+              <a:t>20.03.2017</a:t>
             </a:fld>
             <a:endParaRPr lang="de-DE"/>
           </a:p>
@@ -12312,7 +12312,7 @@
           <a:p>
             <a:fld id="{CD69044A-C769-4552-8429-3F47D64660A8}" type="datetimeFigureOut">
               <a:rPr lang="de-DE" smtClean="0"/>
-              <a:t>19.03.2017</a:t>
+              <a:t>20.03.2017</a:t>
             </a:fld>
             <a:endParaRPr lang="de-DE"/>
           </a:p>
@@ -12430,7 +12430,7 @@
           <a:p>
             <a:fld id="{CD69044A-C769-4552-8429-3F47D64660A8}" type="datetimeFigureOut">
               <a:rPr lang="de-DE" smtClean="0"/>
-              <a:t>19.03.2017</a:t>
+              <a:t>20.03.2017</a:t>
             </a:fld>
             <a:endParaRPr lang="de-DE"/>
           </a:p>
@@ -12548,7 +12548,7 @@
           <a:p>
             <a:fld id="{CD69044A-C769-4552-8429-3F47D64660A8}" type="datetimeFigureOut">
               <a:rPr lang="de-DE" smtClean="0"/>
-              <a:t>19.03.2017</a:t>
+              <a:t>20.03.2017</a:t>
             </a:fld>
             <a:endParaRPr lang="de-DE"/>
           </a:p>
@@ -12832,7 +12832,7 @@
           <a:p>
             <a:fld id="{CD69044A-C769-4552-8429-3F47D64660A8}" type="datetimeFigureOut">
               <a:rPr lang="de-DE" smtClean="0"/>
-              <a:t>19.03.2017</a:t>
+              <a:t>20.03.2017</a:t>
             </a:fld>
             <a:endParaRPr lang="de-DE"/>
           </a:p>
@@ -13096,7 +13096,7 @@
           <a:p>
             <a:fld id="{CD69044A-C769-4552-8429-3F47D64660A8}" type="datetimeFigureOut">
               <a:rPr lang="de-DE" smtClean="0"/>
-              <a:t>19.03.2017</a:t>
+              <a:t>20.03.2017</a:t>
             </a:fld>
             <a:endParaRPr lang="de-DE"/>
           </a:p>
@@ -13266,7 +13266,7 @@
           <a:p>
             <a:fld id="{CD69044A-C769-4552-8429-3F47D64660A8}" type="datetimeFigureOut">
               <a:rPr lang="de-DE" smtClean="0"/>
-              <a:t>19.03.2017</a:t>
+              <a:t>20.03.2017</a:t>
             </a:fld>
             <a:endParaRPr lang="de-DE"/>
           </a:p>
@@ -13446,7 +13446,7 @@
           <a:p>
             <a:fld id="{CD69044A-C769-4552-8429-3F47D64660A8}" type="datetimeFigureOut">
               <a:rPr lang="de-DE" smtClean="0"/>
-              <a:t>19.03.2017</a:t>
+              <a:t>20.03.2017</a:t>
             </a:fld>
             <a:endParaRPr lang="de-DE"/>
           </a:p>
@@ -13733,7 +13733,7 @@
           <a:p>
             <a:fld id="{CD69044A-C769-4552-8429-3F47D64660A8}" type="datetimeFigureOut">
               <a:rPr lang="de-DE" smtClean="0"/>
-              <a:t>19.03.2017</a:t>
+              <a:t>20.03.2017</a:t>
             </a:fld>
             <a:endParaRPr lang="de-DE"/>
           </a:p>
@@ -13941,7 +13941,7 @@
           <a:p>
             <a:fld id="{CD69044A-C769-4552-8429-3F47D64660A8}" type="datetimeFigureOut">
               <a:rPr lang="de-DE" smtClean="0"/>
-              <a:t>19.03.2017</a:t>
+              <a:t>20.03.2017</a:t>
             </a:fld>
             <a:endParaRPr lang="de-DE"/>
           </a:p>
@@ -14284,7 +14284,7 @@
           <a:p>
             <a:fld id="{CD69044A-C769-4552-8429-3F47D64660A8}" type="datetimeFigureOut">
               <a:rPr lang="de-DE" smtClean="0"/>
-              <a:t>19.03.2017</a:t>
+              <a:t>20.03.2017</a:t>
             </a:fld>
             <a:endParaRPr lang="de-DE"/>
           </a:p>
@@ -14417,7 +14417,7 @@
           <a:p>
             <a:fld id="{CD69044A-C769-4552-8429-3F47D64660A8}" type="datetimeFigureOut">
               <a:rPr lang="de-DE" smtClean="0"/>
-              <a:t>19.03.2017</a:t>
+              <a:t>20.03.2017</a:t>
             </a:fld>
             <a:endParaRPr lang="de-DE"/>
           </a:p>
@@ -14654,7 +14654,7 @@
           <a:p>
             <a:fld id="{CD69044A-C769-4552-8429-3F47D64660A8}" type="datetimeFigureOut">
               <a:rPr lang="de-DE" smtClean="0"/>
-              <a:t>19.03.2017</a:t>
+              <a:t>20.03.2017</a:t>
             </a:fld>
             <a:endParaRPr lang="de-DE"/>
           </a:p>
@@ -15033,7 +15033,7 @@
           <a:p>
             <a:fld id="{CD69044A-C769-4552-8429-3F47D64660A8}" type="datetimeFigureOut">
               <a:rPr lang="de-DE" smtClean="0"/>
-              <a:t>19.03.2017</a:t>
+              <a:t>20.03.2017</a:t>
             </a:fld>
             <a:endParaRPr lang="de-DE"/>
           </a:p>
@@ -15151,7 +15151,7 @@
           <a:p>
             <a:fld id="{CD69044A-C769-4552-8429-3F47D64660A8}" type="datetimeFigureOut">
               <a:rPr lang="de-DE" smtClean="0"/>
-              <a:t>19.03.2017</a:t>
+              <a:t>20.03.2017</a:t>
             </a:fld>
             <a:endParaRPr lang="de-DE"/>
           </a:p>
@@ -15322,7 +15322,7 @@
           <a:p>
             <a:fld id="{CD69044A-C769-4552-8429-3F47D64660A8}" type="datetimeFigureOut">
               <a:rPr lang="de-DE" smtClean="0"/>
-              <a:t>19.03.2017</a:t>
+              <a:t>20.03.2017</a:t>
             </a:fld>
             <a:endParaRPr lang="de-DE"/>
           </a:p>
@@ -15676,7 +15676,7 @@
           <a:p>
             <a:fld id="{CD69044A-C769-4552-8429-3F47D64660A8}" type="datetimeFigureOut">
               <a:rPr lang="de-DE" smtClean="0"/>
-              <a:t>19.03.2017</a:t>
+              <a:t>20.03.2017</a:t>
             </a:fld>
             <a:endParaRPr lang="de-DE"/>
           </a:p>
@@ -16058,7 +16058,7 @@
           <a:p>
             <a:fld id="{CD69044A-C769-4552-8429-3F47D64660A8}" type="datetimeFigureOut">
               <a:rPr lang="de-DE" smtClean="0"/>
-              <a:t>19.03.2017</a:t>
+              <a:t>20.03.2017</a:t>
             </a:fld>
             <a:endParaRPr lang="de-DE"/>
           </a:p>
@@ -16228,7 +16228,7 @@
           <a:p>
             <a:fld id="{CD69044A-C769-4552-8429-3F47D64660A8}" type="datetimeFigureOut">
               <a:rPr lang="de-DE" smtClean="0"/>
-              <a:t>19.03.2017</a:t>
+              <a:t>20.03.2017</a:t>
             </a:fld>
             <a:endParaRPr lang="de-DE"/>
           </a:p>
@@ -16484,7 +16484,7 @@
           <a:p>
             <a:fld id="{CD69044A-C769-4552-8429-3F47D64660A8}" type="datetimeFigureOut">
               <a:rPr lang="de-DE" smtClean="0"/>
-              <a:t>19.03.2017</a:t>
+              <a:t>20.03.2017</a:t>
             </a:fld>
             <a:endParaRPr lang="de-DE"/>
           </a:p>
@@ -16768,7 +16768,7 @@
           <a:p>
             <a:fld id="{CD69044A-C769-4552-8429-3F47D64660A8}" type="datetimeFigureOut">
               <a:rPr lang="de-DE" smtClean="0"/>
-              <a:t>19.03.2017</a:t>
+              <a:t>20.03.2017</a:t>
             </a:fld>
             <a:endParaRPr lang="de-DE"/>
           </a:p>
@@ -17032,7 +17032,7 @@
           <a:p>
             <a:fld id="{CD69044A-C769-4552-8429-3F47D64660A8}" type="datetimeFigureOut">
               <a:rPr lang="de-DE" smtClean="0"/>
-              <a:t>19.03.2017</a:t>
+              <a:t>20.03.2017</a:t>
             </a:fld>
             <a:endParaRPr lang="de-DE"/>
           </a:p>
@@ -17246,7 +17246,7 @@
           <a:p>
             <a:fld id="{CD69044A-C769-4552-8429-3F47D64660A8}" type="datetimeFigureOut">
               <a:rPr lang="de-DE" smtClean="0"/>
-              <a:t>19.03.2017</a:t>
+              <a:t>20.03.2017</a:t>
             </a:fld>
             <a:endParaRPr lang="de-DE"/>
           </a:p>
@@ -17776,7 +17776,7 @@
           <a:p>
             <a:fld id="{CD69044A-C769-4552-8429-3F47D64660A8}" type="datetimeFigureOut">
               <a:rPr lang="de-DE" smtClean="0"/>
-              <a:t>19.03.2017</a:t>
+              <a:t>20.03.2017</a:t>
             </a:fld>
             <a:endParaRPr lang="de-DE"/>
           </a:p>
@@ -18306,7 +18306,7 @@
           <a:p>
             <a:fld id="{CD69044A-C769-4552-8429-3F47D64660A8}" type="datetimeFigureOut">
               <a:rPr lang="de-DE" smtClean="0"/>
-              <a:t>19.03.2017</a:t>
+              <a:t>20.03.2017</a:t>
             </a:fld>
             <a:endParaRPr lang="de-DE"/>
           </a:p>
@@ -18836,7 +18836,7 @@
           <a:p>
             <a:fld id="{CD69044A-C769-4552-8429-3F47D64660A8}" type="datetimeFigureOut">
               <a:rPr lang="de-DE" smtClean="0"/>
-              <a:t>19.03.2017</a:t>
+              <a:t>20.03.2017</a:t>
             </a:fld>
             <a:endParaRPr lang="de-DE"/>
           </a:p>
@@ -19366,7 +19366,7 @@
           <a:p>
             <a:fld id="{CD69044A-C769-4552-8429-3F47D64660A8}" type="datetimeFigureOut">
               <a:rPr lang="de-DE" smtClean="0"/>
-              <a:t>19.03.2017</a:t>
+              <a:t>20.03.2017</a:t>
             </a:fld>
             <a:endParaRPr lang="de-DE"/>
           </a:p>
@@ -19896,7 +19896,7 @@
           <a:p>
             <a:fld id="{CD69044A-C769-4552-8429-3F47D64660A8}" type="datetimeFigureOut">
               <a:rPr lang="de-DE" smtClean="0"/>
-              <a:t>19.03.2017</a:t>
+              <a:t>20.03.2017</a:t>
             </a:fld>
             <a:endParaRPr lang="de-DE"/>
           </a:p>
@@ -20499,7 +20499,7 @@
           <a:p>
             <a:fld id="{CD69044A-C769-4552-8429-3F47D64660A8}" type="datetimeFigureOut">
               <a:rPr lang="de-DE" smtClean="0"/>
-              <a:t>19.03.2017</a:t>
+              <a:t>20.03.2017</a:t>
             </a:fld>
             <a:endParaRPr lang="de-DE"/>
           </a:p>
@@ -21572,13 +21572,16 @@
             </a:r>
           </a:p>
           <a:p>
-            <a:pPr marL="0" indent="0">
-              <a:buNone/>
-            </a:pPr>
             <a:r>
               <a:rPr lang="de-DE" dirty="0"/>
-              <a:t> Mittelung der GPS-Daten</a:t>
-            </a:r>
+              <a:t>Mittelung der GPS-Daten</a:t>
+            </a:r>
+          </a:p>
+          <a:p>
+            <a:endParaRPr lang="de-DE" dirty="0"/>
+          </a:p>
+          <a:p>
+            <a:endParaRPr lang="de-DE" dirty="0"/>
           </a:p>
           <a:p>
             <a:pPr marL="0" indent="0">
@@ -22920,7 +22923,7 @@
         </p:blipFill>
         <p:spPr>
           <a:xfrm>
-            <a:off x="4648950" y="4609823"/>
+            <a:off x="4828461" y="4627593"/>
             <a:ext cx="1999450" cy="680085"/>
           </a:xfrm>
           <a:prstGeom prst="rect">
@@ -23010,7 +23013,7 @@
         </p:blipFill>
         <p:spPr>
           <a:xfrm>
-            <a:off x="4049743" y="3638757"/>
+            <a:off x="3952199" y="3638757"/>
             <a:ext cx="1198415" cy="994241"/>
           </a:xfrm>
           <a:prstGeom prst="rect">

</xml_diff>

<commit_message>
aranged Statistik and Lernerfahrungen
</commit_message>
<xml_diff>
--- a/Abschlusspräsentation/Abschlusspräsentation.pptx
+++ b/Abschlusspräsentation/Abschlusspräsentation.pptx
@@ -21260,85 +21260,61 @@
         <p:spPr/>
         <p:txBody>
           <a:bodyPr>
-            <a:normAutofit lnSpcReduction="10000"/>
+            <a:normAutofit/>
           </a:bodyPr>
           <a:lstStyle/>
           <a:p>
+            <a:pPr marL="201168" lvl="1" indent="0">
+              <a:buNone/>
+            </a:pPr>
             <a:r>
               <a:rPr lang="de-DE" dirty="0"/>
-              <a:t>Spezifisches Programmieren</a:t>
-            </a:r>
-          </a:p>
-          <a:p>
-            <a:pPr lvl="1"/>
+              <a:t>Android</a:t>
+            </a:r>
+          </a:p>
+          <a:p>
+            <a:pPr marL="201168" lvl="1" indent="0">
+              <a:buNone/>
+            </a:pPr>
             <a:r>
               <a:rPr lang="de-DE" dirty="0"/>
               <a:t>Datenbanken</a:t>
             </a:r>
           </a:p>
           <a:p>
-            <a:pPr lvl="1"/>
+            <a:pPr marL="201168" lvl="1" indent="0">
+              <a:buNone/>
+            </a:pPr>
             <a:r>
               <a:rPr lang="de-DE" dirty="0"/>
               <a:t>Client-Server-Kommunikation</a:t>
             </a:r>
           </a:p>
           <a:p>
+            <a:pPr marL="201168" lvl="1" indent="0">
+              <a:buNone/>
+            </a:pPr>
             <a:r>
               <a:rPr lang="de-DE" dirty="0"/>
-              <a:t>Weitere Lernerfahrungen</a:t>
-            </a:r>
-          </a:p>
-          <a:p>
-            <a:pPr lvl="1"/>
-            <a:r>
-              <a:rPr lang="de-DE" dirty="0" err="1"/>
-              <a:t>LaTex</a:t>
-            </a:r>
-            <a:endParaRPr lang="de-DE" dirty="0"/>
-          </a:p>
-          <a:p>
-            <a:pPr lvl="1"/>
-            <a:r>
-              <a:rPr lang="de-DE" dirty="0" err="1"/>
-              <a:t>Git</a:t>
-            </a:r>
-            <a:endParaRPr lang="de-DE" dirty="0"/>
-          </a:p>
-          <a:p>
-            <a:pPr lvl="1"/>
+              <a:t>Versionskontrolle und Dokumentation</a:t>
+            </a:r>
+          </a:p>
+          <a:p>
+            <a:pPr marL="201168" lvl="1" indent="0">
+              <a:buNone/>
+            </a:pPr>
             <a:r>
               <a:rPr lang="de-DE" dirty="0"/>
               <a:t>Clean Code</a:t>
             </a:r>
           </a:p>
           <a:p>
-            <a:r>
-              <a:rPr lang="de-DE" dirty="0"/>
-              <a:t>Menschliches</a:t>
-            </a:r>
-          </a:p>
-          <a:p>
-            <a:pPr lvl="1"/>
-            <a:r>
-              <a:rPr lang="de-DE" dirty="0"/>
-              <a:t>Probleme rechtzeitig kommunizieren</a:t>
-            </a:r>
-          </a:p>
-          <a:p>
-            <a:pPr lvl="1"/>
+            <a:pPr marL="201168" lvl="1" indent="0">
+              <a:buNone/>
+            </a:pPr>
             <a:r>
               <a:rPr lang="de-DE" dirty="0"/>
               <a:t>Teamarbeit</a:t>
-            </a:r>
-          </a:p>
-          <a:p>
-            <a:pPr marL="201168" lvl="1" indent="0">
-              <a:buNone/>
-            </a:pPr>
-            <a:r>
-              <a:rPr lang="de-DE" dirty="0"/>
-              <a:t>Haben nach Implementierungsabgabe noch in der Testphase Sachen implementiert</a:t>
             </a:r>
           </a:p>
         </p:txBody>
@@ -23479,40 +23455,22 @@
               <a:buNone/>
             </a:pPr>
             <a:r>
-              <a:rPr lang="de-DE" dirty="0"/>
-              <a:t>	</a:t>
-            </a:r>
-            <a:r>
-              <a:rPr lang="de-DE">
+              <a:rPr lang="de-DE" dirty="0">
                 <a:solidFill>
-                  <a:schemeClr val="bg1">
-                    <a:lumMod val="85000"/>
-                  </a:schemeClr>
+                  <a:schemeClr val="tx1"/>
                 </a:solidFill>
               </a:rPr>
-              <a:t>- 189 </a:t>
-            </a:r>
+              <a:t>	- 189 Unit Tests</a:t>
+            </a:r>
+          </a:p>
+          <a:p>
+            <a:pPr marL="0" indent="0">
+              <a:buNone/>
+            </a:pPr>
             <a:r>
               <a:rPr lang="de-DE" dirty="0">
                 <a:solidFill>
-                  <a:schemeClr val="bg1">
-                    <a:lumMod val="85000"/>
-                  </a:schemeClr>
-                </a:solidFill>
-              </a:rPr>
-              <a:t>Unit Tests</a:t>
-            </a:r>
-          </a:p>
-          <a:p>
-            <a:pPr marL="0" indent="0">
-              <a:buNone/>
-            </a:pPr>
-            <a:r>
-              <a:rPr lang="de-DE" dirty="0">
-                <a:solidFill>
-                  <a:schemeClr val="bg1">
-                    <a:lumMod val="85000"/>
-                  </a:schemeClr>
+                  <a:schemeClr val="tx1"/>
                 </a:solidFill>
               </a:rPr>
               <a:t>	- 134 Integration Tests</a:t>
@@ -23525,22 +23483,10 @@
             <a:r>
               <a:rPr lang="de-DE" dirty="0">
                 <a:solidFill>
-                  <a:schemeClr val="bg1">
-                    <a:lumMod val="85000"/>
-                  </a:schemeClr>
+                  <a:schemeClr val="tx1"/>
                 </a:solidFill>
               </a:rPr>
               <a:t>	- 27 Manuelle Testfälle</a:t>
-            </a:r>
-          </a:p>
-          <a:p>
-            <a:r>
-              <a:rPr lang="de-DE" dirty="0" err="1"/>
-              <a:t>Commits</a:t>
-            </a:r>
-            <a:r>
-              <a:rPr lang="de-DE" dirty="0"/>
-              <a:t>?</a:t>
             </a:r>
           </a:p>
         </p:txBody>

</xml_diff>